<commit_message>
finalized...for now at least
</commit_message>
<xml_diff>
--- a/EliKravitz_ProjectPresentation.pptx
+++ b/EliKravitz_ProjectPresentation.pptx
@@ -5,7 +5,7 @@
     <p:sldMasterId id="2147483648" r:id="rId1"/>
   </p:sldMasterIdLst>
   <p:notesMasterIdLst>
-    <p:notesMasterId r:id="rId14"/>
+    <p:notesMasterId r:id="rId17"/>
   </p:notesMasterIdLst>
   <p:sldIdLst>
     <p:sldId id="256" r:id="rId2"/>
@@ -14,12 +14,15 @@
     <p:sldId id="267" r:id="rId5"/>
     <p:sldId id="269" r:id="rId6"/>
     <p:sldId id="270" r:id="rId7"/>
-    <p:sldId id="273" r:id="rId8"/>
-    <p:sldId id="275" r:id="rId9"/>
-    <p:sldId id="272" r:id="rId10"/>
-    <p:sldId id="276" r:id="rId11"/>
+    <p:sldId id="272" r:id="rId8"/>
+    <p:sldId id="276" r:id="rId9"/>
+    <p:sldId id="273" r:id="rId10"/>
+    <p:sldId id="275" r:id="rId11"/>
     <p:sldId id="274" r:id="rId12"/>
-    <p:sldId id="266" r:id="rId13"/>
+    <p:sldId id="277" r:id="rId13"/>
+    <p:sldId id="278" r:id="rId14"/>
+    <p:sldId id="279" r:id="rId15"/>
+    <p:sldId id="266" r:id="rId16"/>
   </p:sldIdLst>
   <p:sldSz cx="12192000" cy="6858000"/>
   <p:notesSz cx="6858000" cy="9144000"/>
@@ -3663,7 +3666,7 @@
         </p:nvSpPr>
         <p:spPr>
           <a:xfrm>
-            <a:off x="0" y="1538343"/>
+            <a:off x="0" y="2448506"/>
             <a:ext cx="12192000" cy="1960987"/>
           </a:xfrm>
         </p:spPr>
@@ -3696,78 +3699,29 @@
               </a:rPr>
               <a:t>Future Outlook</a:t>
             </a:r>
+            <a:br>
+              <a:rPr lang="en-US" sz="4900" dirty="0">
+                <a:solidFill>
+                  <a:srgbClr val="CFB87C"/>
+                </a:solidFill>
+              </a:rPr>
+            </a:br>
+            <a:br>
+              <a:rPr lang="en-US" sz="4900" dirty="0">
+                <a:solidFill>
+                  <a:srgbClr val="CFB87C"/>
+                </a:solidFill>
+              </a:rPr>
+            </a:br>
+            <a:r>
+              <a:rPr lang="en-US" sz="2000" dirty="0">
+                <a:solidFill>
+                  <a:srgbClr val="CFB87C"/>
+                </a:solidFill>
+              </a:rPr>
+              <a:t>Eli Kravitz</a:t>
+            </a:r>
             <a:endParaRPr lang="en-US" sz="4900" dirty="0"/>
-          </a:p>
-        </p:txBody>
-      </p:sp>
-      <p:sp>
-        <p:nvSpPr>
-          <p:cNvPr id="6" name="Subtitle 5"/>
-          <p:cNvSpPr>
-            <a:spLocks noGrp="1"/>
-          </p:cNvSpPr>
-          <p:nvPr>
-            <p:ph type="subTitle" idx="1"/>
-          </p:nvPr>
-        </p:nvSpPr>
-        <p:spPr>
-          <a:xfrm>
-            <a:off x="1524000" y="3602038"/>
-            <a:ext cx="9144000" cy="2426622"/>
-          </a:xfrm>
-        </p:spPr>
-        <p:txBody>
-          <a:bodyPr>
-            <a:normAutofit/>
-          </a:bodyPr>
-          <a:lstStyle/>
-          <a:p>
-            <a:endParaRPr lang="en-US" dirty="0"/>
-          </a:p>
-          <a:p>
-            <a:r>
-              <a:rPr lang="en-US" dirty="0">
-                <a:solidFill>
-                  <a:schemeClr val="bg1"/>
-                </a:solidFill>
-              </a:rPr>
-              <a:t>Your Name Here</a:t>
-            </a:r>
-          </a:p>
-          <a:p>
-            <a:r>
-              <a:rPr lang="en-US" i="1" dirty="0">
-                <a:solidFill>
-                  <a:schemeClr val="bg1"/>
-                </a:solidFill>
-              </a:rPr>
-              <a:t>Title</a:t>
-            </a:r>
-          </a:p>
-          <a:p>
-            <a:r>
-              <a:rPr lang="en-US" dirty="0">
-                <a:solidFill>
-                  <a:schemeClr val="bg1"/>
-                </a:solidFill>
-              </a:rPr>
-              <a:t>Smead Aerospace Engineering Sciences Dept.</a:t>
-            </a:r>
-          </a:p>
-          <a:p>
-            <a:r>
-              <a:rPr lang="en-US">
-                <a:solidFill>
-                  <a:schemeClr val="bg1"/>
-                </a:solidFill>
-              </a:rPr>
-              <a:t>April 5, 2063</a:t>
-            </a:r>
-            <a:endParaRPr lang="en-US" dirty="0">
-              <a:solidFill>
-                <a:schemeClr val="bg1"/>
-              </a:solidFill>
-            </a:endParaRPr>
           </a:p>
         </p:txBody>
       </p:sp>
@@ -3818,7 +3772,7 @@
           <a:p>
             <a:r>
               <a:rPr lang="en-US" dirty="0"/>
-              <a:t>Results: Time Series Forecasting</a:t>
+              <a:t>Results: Neural Networks</a:t>
             </a:r>
           </a:p>
         </p:txBody>
@@ -3836,12 +3790,12 @@
         <p:spPr>
           <a:xfrm>
             <a:off x="838200" y="1644870"/>
-            <a:ext cx="6705600" cy="2869980"/>
+            <a:ext cx="6705600" cy="1325563"/>
           </a:xfrm>
         </p:spPr>
         <p:txBody>
           <a:bodyPr>
-            <a:normAutofit/>
+            <a:normAutofit fontScale="77500" lnSpcReduction="20000"/>
           </a:bodyPr>
           <a:lstStyle/>
           <a:p>
@@ -3853,7 +3807,26 @@
                 <a:effectLst/>
                 <a:latin typeface="helvetica-w01-roman"/>
               </a:rPr>
-              <a:t>Linear model does not allow for </a:t>
+              <a:t>NN was trained for 1000 epochs</a:t>
+            </a:r>
+          </a:p>
+          <a:p>
+            <a:endParaRPr lang="en-US" dirty="0">
+              <a:solidFill>
+                <a:srgbClr val="000000"/>
+              </a:solidFill>
+              <a:latin typeface="helvetica-w01-roman"/>
+            </a:endParaRPr>
+          </a:p>
+          <a:p>
+            <a:r>
+              <a:rPr lang="en-US" dirty="0">
+                <a:solidFill>
+                  <a:srgbClr val="000000"/>
+                </a:solidFill>
+                <a:latin typeface="helvetica-w01-roman"/>
+              </a:rPr>
+              <a:t>Confusion matrix indicates imperfect performance</a:t>
             </a:r>
             <a:endParaRPr lang="en-US" dirty="0"/>
           </a:p>
@@ -3879,6 +3852,49 @@
               <a:t>10</a:t>
             </a:fld>
             <a:endParaRPr lang="en-US"/>
+          </a:p>
+        </p:txBody>
+      </p:sp>
+      <p:sp>
+        <p:nvSpPr>
+          <p:cNvPr id="8" name="TextBox 7">
+            <a:extLst>
+              <a:ext uri="{FF2B5EF4-FFF2-40B4-BE49-F238E27FC236}">
+                <a16:creationId xmlns:a16="http://schemas.microsoft.com/office/drawing/2014/main" id="{14DB306A-8480-9369-B1AF-47EA31B84458}"/>
+              </a:ext>
+            </a:extLst>
+          </p:cNvPr>
+          <p:cNvSpPr txBox="1"/>
+          <p:nvPr/>
+        </p:nvSpPr>
+        <p:spPr>
+          <a:xfrm>
+            <a:off x="7986713" y="5667478"/>
+            <a:ext cx="4205286" cy="307777"/>
+          </a:xfrm>
+          <a:prstGeom prst="rect">
+            <a:avLst/>
+          </a:prstGeom>
+          <a:noFill/>
+        </p:spPr>
+        <p:txBody>
+          <a:bodyPr wrap="square" rtlCol="0">
+            <a:spAutoFit/>
+          </a:bodyPr>
+          <a:lstStyle/>
+          <a:p>
+            <a:pPr algn="ctr"/>
+            <a:r>
+              <a:rPr lang="en-US" sz="1400" b="0" i="0" dirty="0">
+                <a:solidFill>
+                  <a:srgbClr val="000000"/>
+                </a:solidFill>
+                <a:effectLst/>
+                <a:latin typeface="helvetica-w01-roman"/>
+              </a:rPr>
+              <a:t>Figure 9: FFNN normalized confusion matrix</a:t>
+            </a:r>
+            <a:endParaRPr lang="en-US" sz="1400" dirty="0"/>
           </a:p>
         </p:txBody>
       </p:sp>
@@ -3904,8 +3920,37 @@
         </p:blipFill>
         <p:spPr>
           <a:xfrm>
-            <a:off x="8089807" y="2970433"/>
+            <a:off x="1827119" y="2984961"/>
             <a:ext cx="3624553" cy="2547152"/>
+          </a:xfrm>
+          <a:prstGeom prst="rect">
+            <a:avLst/>
+          </a:prstGeom>
+        </p:spPr>
+      </p:pic>
+      <p:pic>
+        <p:nvPicPr>
+          <p:cNvPr id="10" name="Picture 9" descr="Table, calendar&#10;&#10;Description automatically generated">
+            <a:extLst>
+              <a:ext uri="{FF2B5EF4-FFF2-40B4-BE49-F238E27FC236}">
+                <a16:creationId xmlns:a16="http://schemas.microsoft.com/office/drawing/2014/main" id="{2E5B5441-B7C5-BD19-190D-001CE02105BF}"/>
+              </a:ext>
+            </a:extLst>
+          </p:cNvPr>
+          <p:cNvPicPr>
+            <a:picLocks noChangeAspect="1"/>
+          </p:cNvPicPr>
+          <p:nvPr/>
+        </p:nvPicPr>
+        <p:blipFill rotWithShape="1">
+          <a:blip r:embed="rId3"/>
+          <a:srcRect r="11723"/>
+          <a:stretch/>
+        </p:blipFill>
+        <p:spPr>
+          <a:xfrm>
+            <a:off x="7712758" y="228604"/>
+            <a:ext cx="4479241" cy="5512714"/>
           </a:xfrm>
           <a:prstGeom prst="rect">
             <a:avLst/>
@@ -3926,7 +3971,7 @@
         </p:nvSpPr>
         <p:spPr>
           <a:xfrm>
-            <a:off x="7986714" y="5517585"/>
+            <a:off x="1724026" y="5532113"/>
             <a:ext cx="4205286" cy="307777"/>
           </a:xfrm>
           <a:prstGeom prst="rect">
@@ -3949,7 +3994,7 @@
                 <a:effectLst/>
                 <a:latin typeface="helvetica-w01-roman"/>
               </a:rPr>
-              <a:t>Figure 7: FFNN training loss</a:t>
+              <a:t>Figure 8: FFNN training loss</a:t>
             </a:r>
             <a:endParaRPr lang="en-US" sz="1400" dirty="0"/>
           </a:p>
@@ -3958,7 +4003,7 @@
     </p:spTree>
     <p:extLst>
       <p:ext uri="{BB962C8B-B14F-4D97-AF65-F5344CB8AC3E}">
-        <p14:creationId xmlns:p14="http://schemas.microsoft.com/office/powerpoint/2010/main" val="2246261030"/>
+        <p14:creationId xmlns:p14="http://schemas.microsoft.com/office/powerpoint/2010/main" val="1601318653"/>
       </p:ext>
     </p:extLst>
   </p:cSld>
@@ -4007,72 +4052,202 @@
           </a:p>
         </p:txBody>
       </p:sp>
-      <p:sp>
-        <p:nvSpPr>
-          <p:cNvPr id="3" name="Content Placeholder 2"/>
-          <p:cNvSpPr>
-            <a:spLocks noGrp="1"/>
-          </p:cNvSpPr>
-          <p:nvPr>
-            <p:ph idx="1"/>
-          </p:nvPr>
-        </p:nvSpPr>
-        <p:spPr>
-          <a:xfrm>
-            <a:off x="838199" y="1644871"/>
-            <a:ext cx="10515600" cy="3870104"/>
-          </a:xfrm>
-        </p:spPr>
-        <p:txBody>
-          <a:bodyPr>
-            <a:normAutofit/>
-          </a:bodyPr>
-          <a:lstStyle/>
-          <a:p>
-            <a:r>
-              <a:rPr lang="en-US" dirty="0"/>
-              <a:t>Future snowfall values are predicted for Burlington, VT using the following methodology:</a:t>
-            </a:r>
-          </a:p>
-          <a:p>
-            <a:pPr marL="914400" lvl="1" indent="-457200">
-              <a:buFont typeface="+mj-lt"/>
-              <a:buAutoNum type="arabicPeriod"/>
-            </a:pPr>
-            <a:r>
-              <a:rPr lang="en-US" dirty="0"/>
-              <a:t>Sample 50 points from each of the 13 independent features for a single hour</a:t>
-            </a:r>
-          </a:p>
-          <a:p>
-            <a:pPr marL="914400" lvl="1" indent="-457200">
-              <a:buFont typeface="+mj-lt"/>
-              <a:buAutoNum type="arabicPeriod"/>
-            </a:pPr>
-            <a:r>
-              <a:rPr lang="en-US" dirty="0"/>
-              <a:t>Run each of the 50 samples through the trained NN classifier to predict snowfall</a:t>
-            </a:r>
-          </a:p>
-          <a:p>
-            <a:pPr lvl="2"/>
-            <a:r>
-              <a:rPr lang="en-US" dirty="0"/>
-              <a:t>Convert discrete labels to continuous (i.e., 0”=0.0”, 0.0”-0.1”=0.05”,…, &gt;1”=1.1”)</a:t>
-            </a:r>
-          </a:p>
-          <a:p>
-            <a:pPr marL="914400" lvl="1" indent="-457200">
-              <a:buFont typeface="+mj-lt"/>
-              <a:buAutoNum type="arabicPeriod"/>
-            </a:pPr>
-            <a:r>
-              <a:rPr lang="en-US" dirty="0"/>
-              <a:t>Repeat steps 1 and 2 for three years' worth of data</a:t>
-            </a:r>
-          </a:p>
-        </p:txBody>
-      </p:sp>
+      <mc:AlternateContent xmlns:mc="http://schemas.openxmlformats.org/markup-compatibility/2006">
+        <mc:Choice xmlns:a14="http://schemas.microsoft.com/office/drawing/2010/main" Requires="a14">
+          <p:sp>
+            <p:nvSpPr>
+              <p:cNvPr id="3" name="Content Placeholder 2"/>
+              <p:cNvSpPr>
+                <a:spLocks noGrp="1"/>
+              </p:cNvSpPr>
+              <p:nvPr>
+                <p:ph idx="1"/>
+              </p:nvPr>
+            </p:nvSpPr>
+            <p:spPr>
+              <a:xfrm>
+                <a:off x="838199" y="1644871"/>
+                <a:ext cx="10515600" cy="3870104"/>
+              </a:xfrm>
+            </p:spPr>
+            <p:txBody>
+              <a:bodyPr>
+                <a:normAutofit/>
+              </a:bodyPr>
+              <a:lstStyle/>
+              <a:p>
+                <a:r>
+                  <a:rPr lang="en-US" dirty="0"/>
+                  <a:t>Future snowfall values are predicted for Burlington, VT using the following methodology:</a:t>
+                </a:r>
+              </a:p>
+              <a:p>
+                <a:pPr marL="914400" lvl="1" indent="-457200">
+                  <a:buFont typeface="+mj-lt"/>
+                  <a:buAutoNum type="arabicPeriod"/>
+                </a:pPr>
+                <a:r>
+                  <a:rPr lang="en-US" dirty="0"/>
+                  <a:t>Sample 50 points from each of the 13 independent features for a single hour</a:t>
+                </a:r>
+              </a:p>
+              <a:p>
+                <a:pPr lvl="2"/>
+                <a:r>
+                  <a:rPr lang="en-US" dirty="0"/>
+                  <a:t>Impose constraints on the samples to remove non-physical points (i.e., if temperature &gt; </a:t>
+                </a:r>
+                <a14:m>
+                  <m:oMath xmlns:m="http://schemas.openxmlformats.org/officeDocument/2006/math">
+                    <m:sSup>
+                      <m:sSupPr>
+                        <m:ctrlPr>
+                          <a:rPr lang="en-US" b="0" i="1" smtClean="0">
+                            <a:latin typeface="Cambria Math" panose="02040503050406030204" pitchFamily="18" charset="0"/>
+                          </a:rPr>
+                        </m:ctrlPr>
+                      </m:sSupPr>
+                      <m:e>
+                        <m:r>
+                          <a:rPr lang="en-US" b="0" i="1" smtClean="0">
+                            <a:latin typeface="Cambria Math" panose="02040503050406030204" pitchFamily="18" charset="0"/>
+                          </a:rPr>
+                          <m:t>50</m:t>
+                        </m:r>
+                      </m:e>
+                      <m:sup>
+                        <m:r>
+                          <a:rPr lang="en-US" b="0" i="1" smtClean="0">
+                            <a:latin typeface="Cambria Math" panose="02040503050406030204" pitchFamily="18" charset="0"/>
+                            <a:ea typeface="Cambria Math" panose="02040503050406030204" pitchFamily="18" charset="0"/>
+                          </a:rPr>
+                          <m:t>∘</m:t>
+                        </m:r>
+                      </m:sup>
+                    </m:sSup>
+                    <m:r>
+                      <a:rPr lang="en-US" b="0" i="1" smtClean="0">
+                        <a:latin typeface="Cambria Math" panose="02040503050406030204" pitchFamily="18" charset="0"/>
+                        <a:ea typeface="Cambria Math" panose="02040503050406030204" pitchFamily="18" charset="0"/>
+                      </a:rPr>
+                      <m:t>𝐶</m:t>
+                    </m:r>
+                  </m:oMath>
+                </a14:m>
+                <a:r>
+                  <a:rPr lang="en-US" dirty="0"/>
+                  <a:t>, set to </a:t>
+                </a:r>
+                <a14:m>
+                  <m:oMath xmlns:m="http://schemas.openxmlformats.org/officeDocument/2006/math">
+                    <m:sSup>
+                      <m:sSupPr>
+                        <m:ctrlPr>
+                          <a:rPr lang="en-US" i="1">
+                            <a:latin typeface="Cambria Math" panose="02040503050406030204" pitchFamily="18" charset="0"/>
+                          </a:rPr>
+                        </m:ctrlPr>
+                      </m:sSupPr>
+                      <m:e>
+                        <m:r>
+                          <a:rPr lang="en-US" i="1">
+                            <a:latin typeface="Cambria Math" panose="02040503050406030204" pitchFamily="18" charset="0"/>
+                          </a:rPr>
+                          <m:t>50</m:t>
+                        </m:r>
+                      </m:e>
+                      <m:sup>
+                        <m:r>
+                          <a:rPr lang="en-US" i="1">
+                            <a:latin typeface="Cambria Math" panose="02040503050406030204" pitchFamily="18" charset="0"/>
+                            <a:ea typeface="Cambria Math" panose="02040503050406030204" pitchFamily="18" charset="0"/>
+                          </a:rPr>
+                          <m:t>∘</m:t>
+                        </m:r>
+                      </m:sup>
+                    </m:sSup>
+                    <m:r>
+                      <a:rPr lang="en-US" i="1">
+                        <a:latin typeface="Cambria Math" panose="02040503050406030204" pitchFamily="18" charset="0"/>
+                        <a:ea typeface="Cambria Math" panose="02040503050406030204" pitchFamily="18" charset="0"/>
+                      </a:rPr>
+                      <m:t>𝐶</m:t>
+                    </m:r>
+                  </m:oMath>
+                </a14:m>
+                <a:r>
+                  <a:rPr lang="en-US" dirty="0"/>
+                  <a:t>)</a:t>
+                </a:r>
+              </a:p>
+              <a:p>
+                <a:pPr marL="914400" lvl="1" indent="-457200">
+                  <a:buFont typeface="+mj-lt"/>
+                  <a:buAutoNum type="arabicPeriod"/>
+                </a:pPr>
+                <a:r>
+                  <a:rPr lang="en-US" dirty="0"/>
+                  <a:t>Run each of the 50 samples through the trained NN classifier to predict snowfall</a:t>
+                </a:r>
+              </a:p>
+              <a:p>
+                <a:pPr lvl="2"/>
+                <a:r>
+                  <a:rPr lang="en-US" dirty="0"/>
+                  <a:t>Convert discrete labels to continuous (i.e., 0”=0.0”, 0.0”-0.1”=0.05”,…, &gt;1”=1.05”)</a:t>
+                </a:r>
+              </a:p>
+              <a:p>
+                <a:pPr marL="914400" lvl="1" indent="-457200">
+                  <a:buFont typeface="+mj-lt"/>
+                  <a:buAutoNum type="arabicPeriod"/>
+                </a:pPr>
+                <a:r>
+                  <a:rPr lang="en-US" dirty="0"/>
+                  <a:t>Repeat steps 1 and 2 for three years' worth of data</a:t>
+                </a:r>
+              </a:p>
+            </p:txBody>
+          </p:sp>
+        </mc:Choice>
+        <mc:Fallback>
+          <p:sp>
+            <p:nvSpPr>
+              <p:cNvPr id="3" name="Content Placeholder 2"/>
+              <p:cNvSpPr>
+                <a:spLocks noGrp="1" noRot="1" noChangeAspect="1" noMove="1" noResize="1" noEditPoints="1" noAdjustHandles="1" noChangeArrowheads="1" noChangeShapeType="1" noTextEdit="1"/>
+              </p:cNvSpPr>
+              <p:nvPr>
+                <p:ph idx="1"/>
+              </p:nvPr>
+            </p:nvSpPr>
+            <p:spPr>
+              <a:xfrm>
+                <a:off x="838199" y="1644871"/>
+                <a:ext cx="10515600" cy="3870104"/>
+              </a:xfrm>
+              <a:blipFill>
+                <a:blip r:embed="rId2"/>
+                <a:stretch>
+                  <a:fillRect l="-965" t="-2614"/>
+                </a:stretch>
+              </a:blipFill>
+            </p:spPr>
+            <p:txBody>
+              <a:bodyPr/>
+              <a:lstStyle/>
+              <a:p>
+                <a:r>
+                  <a:rPr lang="en-US">
+                    <a:noFill/>
+                  </a:rPr>
+                  <a:t> </a:t>
+                </a:r>
+              </a:p>
+            </p:txBody>
+          </p:sp>
+        </mc:Fallback>
+      </mc:AlternateContent>
       <p:sp>
         <p:nvSpPr>
           <p:cNvPr id="4" name="Slide Number Placeholder 3"/>
@@ -4143,7 +4318,7 @@
           <a:p>
             <a:r>
               <a:rPr lang="en-US" dirty="0"/>
-              <a:t>References</a:t>
+              <a:t>Results: Simulation</a:t>
             </a:r>
           </a:p>
         </p:txBody>
@@ -4160,13 +4335,586 @@
         </p:nvSpPr>
         <p:spPr>
           <a:xfrm>
-            <a:off x="838200" y="1644870"/>
-            <a:ext cx="11119338" cy="4270155"/>
+            <a:off x="838199" y="1644871"/>
+            <a:ext cx="6219826" cy="3870104"/>
           </a:xfrm>
         </p:spPr>
         <p:txBody>
           <a:bodyPr>
-            <a:normAutofit fontScale="47500" lnSpcReduction="20000"/>
+            <a:normAutofit fontScale="92500" lnSpcReduction="20000"/>
+          </a:bodyPr>
+          <a:lstStyle/>
+          <a:p>
+            <a:r>
+              <a:rPr lang="en-US" dirty="0"/>
+              <a:t>Model tends to drastically over-predict frequency of snowfall events, and under-predict intensity of individual events</a:t>
+            </a:r>
+          </a:p>
+          <a:p>
+            <a:endParaRPr lang="en-US" dirty="0"/>
+          </a:p>
+          <a:p>
+            <a:r>
+              <a:rPr lang="en-US" dirty="0"/>
+              <a:t>Why are predictions poor?</a:t>
+            </a:r>
+          </a:p>
+          <a:p>
+            <a:pPr lvl="1"/>
+            <a:r>
+              <a:rPr lang="en-US" dirty="0"/>
+              <a:t>Assumed features were independent in time series forecasting: NN is likely to be presented with data it was not trained on</a:t>
+            </a:r>
+          </a:p>
+          <a:p>
+            <a:pPr lvl="1"/>
+            <a:r>
+              <a:rPr lang="en-US" dirty="0"/>
+              <a:t>NN model was not adequately trained: a more sophisticated model would likely produce a more optimal confusion matrix</a:t>
+            </a:r>
+          </a:p>
+        </p:txBody>
+      </p:sp>
+      <p:sp>
+        <p:nvSpPr>
+          <p:cNvPr id="4" name="Slide Number Placeholder 3"/>
+          <p:cNvSpPr>
+            <a:spLocks noGrp="1"/>
+          </p:cNvSpPr>
+          <p:nvPr>
+            <p:ph type="sldNum" sz="quarter" idx="12"/>
+          </p:nvPr>
+        </p:nvSpPr>
+        <p:spPr/>
+        <p:txBody>
+          <a:bodyPr/>
+          <a:lstStyle/>
+          <a:p>
+            <a:fld id="{A4DAB268-5651-8449-B4FF-0C1906E4DCE1}" type="slidenum">
+              <a:rPr lang="en-US" smtClean="0"/>
+              <a:t>12</a:t>
+            </a:fld>
+            <a:endParaRPr lang="en-US"/>
+          </a:p>
+        </p:txBody>
+      </p:sp>
+      <p:sp>
+        <p:nvSpPr>
+          <p:cNvPr id="9" name="TextBox 8">
+            <a:extLst>
+              <a:ext uri="{FF2B5EF4-FFF2-40B4-BE49-F238E27FC236}">
+                <a16:creationId xmlns:a16="http://schemas.microsoft.com/office/drawing/2014/main" id="{925B1450-27C6-152F-A151-BD7E5C47756C}"/>
+              </a:ext>
+            </a:extLst>
+          </p:cNvPr>
+          <p:cNvSpPr txBox="1"/>
+          <p:nvPr/>
+        </p:nvSpPr>
+        <p:spPr>
+          <a:xfrm>
+            <a:off x="6829427" y="2673205"/>
+            <a:ext cx="5919787" cy="307777"/>
+          </a:xfrm>
+          <a:prstGeom prst="rect">
+            <a:avLst/>
+          </a:prstGeom>
+          <a:noFill/>
+        </p:spPr>
+        <p:txBody>
+          <a:bodyPr wrap="square" rtlCol="0">
+            <a:spAutoFit/>
+          </a:bodyPr>
+          <a:lstStyle/>
+          <a:p>
+            <a:pPr algn="ctr"/>
+            <a:r>
+              <a:rPr lang="en-US" sz="1400" b="0" i="0" dirty="0">
+                <a:solidFill>
+                  <a:srgbClr val="000000"/>
+                </a:solidFill>
+                <a:effectLst/>
+                <a:latin typeface="helvetica-w01-roman"/>
+              </a:rPr>
+              <a:t>Figure 10: three years of hourly snowfall predictions</a:t>
+            </a:r>
+            <a:endParaRPr lang="en-US" sz="1400" dirty="0"/>
+          </a:p>
+        </p:txBody>
+      </p:sp>
+      <p:sp>
+        <p:nvSpPr>
+          <p:cNvPr id="10" name="TextBox 9">
+            <a:extLst>
+              <a:ext uri="{FF2B5EF4-FFF2-40B4-BE49-F238E27FC236}">
+                <a16:creationId xmlns:a16="http://schemas.microsoft.com/office/drawing/2014/main" id="{5D3DCF32-1536-9847-F6AF-9CB04EE30767}"/>
+              </a:ext>
+            </a:extLst>
+          </p:cNvPr>
+          <p:cNvSpPr txBox="1"/>
+          <p:nvPr/>
+        </p:nvSpPr>
+        <p:spPr>
+          <a:xfrm>
+            <a:off x="6829426" y="5772797"/>
+            <a:ext cx="5919787" cy="307777"/>
+          </a:xfrm>
+          <a:prstGeom prst="rect">
+            <a:avLst/>
+          </a:prstGeom>
+          <a:noFill/>
+        </p:spPr>
+        <p:txBody>
+          <a:bodyPr wrap="square" rtlCol="0">
+            <a:spAutoFit/>
+          </a:bodyPr>
+          <a:lstStyle/>
+          <a:p>
+            <a:pPr algn="ctr"/>
+            <a:r>
+              <a:rPr lang="en-US" sz="1400" b="0" i="0" dirty="0">
+                <a:solidFill>
+                  <a:srgbClr val="000000"/>
+                </a:solidFill>
+                <a:effectLst/>
+                <a:latin typeface="helvetica-w01-roman"/>
+              </a:rPr>
+              <a:t>Figure 11: three years of yearly snowfall predictions</a:t>
+            </a:r>
+            <a:endParaRPr lang="en-US" sz="1400" dirty="0"/>
+          </a:p>
+        </p:txBody>
+      </p:sp>
+      <p:pic>
+        <p:nvPicPr>
+          <p:cNvPr id="14" name="Picture 13" descr="Chart, line chart&#10;&#10;Description automatically generated">
+            <a:extLst>
+              <a:ext uri="{FF2B5EF4-FFF2-40B4-BE49-F238E27FC236}">
+                <a16:creationId xmlns:a16="http://schemas.microsoft.com/office/drawing/2014/main" id="{5D8D6039-0196-DA70-ABE6-5601355C75F7}"/>
+              </a:ext>
+            </a:extLst>
+          </p:cNvPr>
+          <p:cNvPicPr>
+            <a:picLocks noChangeAspect="1"/>
+          </p:cNvPicPr>
+          <p:nvPr/>
+        </p:nvPicPr>
+        <p:blipFill>
+          <a:blip r:embed="rId2"/>
+          <a:stretch>
+            <a:fillRect/>
+          </a:stretch>
+        </p:blipFill>
+        <p:spPr>
+          <a:xfrm>
+            <a:off x="7527233" y="3086749"/>
+            <a:ext cx="4151586" cy="2743200"/>
+          </a:xfrm>
+          <a:prstGeom prst="rect">
+            <a:avLst/>
+          </a:prstGeom>
+        </p:spPr>
+      </p:pic>
+      <p:pic>
+        <p:nvPicPr>
+          <p:cNvPr id="16" name="Picture 15" descr="Chart&#10;&#10;Description automatically generated">
+            <a:extLst>
+              <a:ext uri="{FF2B5EF4-FFF2-40B4-BE49-F238E27FC236}">
+                <a16:creationId xmlns:a16="http://schemas.microsoft.com/office/drawing/2014/main" id="{A3694181-4C60-3F82-ED8D-8A5409276731}"/>
+              </a:ext>
+            </a:extLst>
+          </p:cNvPr>
+          <p:cNvPicPr>
+            <a:picLocks noChangeAspect="1"/>
+          </p:cNvPicPr>
+          <p:nvPr/>
+        </p:nvPicPr>
+        <p:blipFill>
+          <a:blip r:embed="rId3"/>
+          <a:stretch>
+            <a:fillRect/>
+          </a:stretch>
+        </p:blipFill>
+        <p:spPr>
+          <a:xfrm>
+            <a:off x="7689743" y="19527"/>
+            <a:ext cx="3826565" cy="2743200"/>
+          </a:xfrm>
+          <a:prstGeom prst="rect">
+            <a:avLst/>
+          </a:prstGeom>
+        </p:spPr>
+      </p:pic>
+    </p:spTree>
+    <p:extLst>
+      <p:ext uri="{BB962C8B-B14F-4D97-AF65-F5344CB8AC3E}">
+        <p14:creationId xmlns:p14="http://schemas.microsoft.com/office/powerpoint/2010/main" val="672232847"/>
+      </p:ext>
+    </p:extLst>
+  </p:cSld>
+  <p:clrMapOvr>
+    <a:masterClrMapping/>
+  </p:clrMapOvr>
+</p:sld>
+</file>
+
+<file path=ppt/slides/slide13.xml><?xml version="1.0" encoding="utf-8"?>
+<p:sld xmlns:a="http://schemas.openxmlformats.org/drawingml/2006/main" xmlns:r="http://schemas.openxmlformats.org/officeDocument/2006/relationships" xmlns:p="http://schemas.openxmlformats.org/presentationml/2006/main">
+  <p:cSld>
+    <p:spTree>
+      <p:nvGrpSpPr>
+        <p:cNvPr id="1" name=""/>
+        <p:cNvGrpSpPr/>
+        <p:nvPr/>
+      </p:nvGrpSpPr>
+      <p:grpSpPr>
+        <a:xfrm>
+          <a:off x="0" y="0"/>
+          <a:ext cx="0" cy="0"/>
+          <a:chOff x="0" y="0"/>
+          <a:chExt cx="0" cy="0"/>
+        </a:xfrm>
+      </p:grpSpPr>
+      <p:sp>
+        <p:nvSpPr>
+          <p:cNvPr id="2" name="Title 1"/>
+          <p:cNvSpPr>
+            <a:spLocks noGrp="1"/>
+          </p:cNvSpPr>
+          <p:nvPr>
+            <p:ph type="title"/>
+          </p:nvPr>
+        </p:nvSpPr>
+        <p:spPr/>
+        <p:txBody>
+          <a:bodyPr/>
+          <a:lstStyle/>
+          <a:p>
+            <a:r>
+              <a:rPr lang="en-US" dirty="0"/>
+              <a:t>Conclusions</a:t>
+            </a:r>
+          </a:p>
+        </p:txBody>
+      </p:sp>
+      <p:sp>
+        <p:nvSpPr>
+          <p:cNvPr id="3" name="Content Placeholder 2"/>
+          <p:cNvSpPr>
+            <a:spLocks noGrp="1"/>
+          </p:cNvSpPr>
+          <p:nvPr>
+            <p:ph idx="1"/>
+          </p:nvPr>
+        </p:nvSpPr>
+        <p:spPr>
+          <a:xfrm>
+            <a:off x="838198" y="1644871"/>
+            <a:ext cx="10515599" cy="3870104"/>
+          </a:xfrm>
+        </p:spPr>
+        <p:txBody>
+          <a:bodyPr>
+            <a:normAutofit/>
+          </a:bodyPr>
+          <a:lstStyle/>
+          <a:p>
+            <a:r>
+              <a:rPr lang="en-US" dirty="0"/>
+              <a:t>Developed a framework to predict future snowfall in Vermont</a:t>
+            </a:r>
+          </a:p>
+          <a:p>
+            <a:pPr lvl="1"/>
+            <a:r>
+              <a:rPr lang="en-US" dirty="0"/>
+              <a:t>Used time series forecasting to propagate independent features into the future</a:t>
+            </a:r>
+          </a:p>
+          <a:p>
+            <a:pPr lvl="1"/>
+            <a:r>
+              <a:rPr lang="en-US" dirty="0"/>
+              <a:t>Used a FFNN to map between independent features and snowfall</a:t>
+            </a:r>
+          </a:p>
+          <a:p>
+            <a:pPr lvl="1"/>
+            <a:r>
+              <a:rPr lang="en-US" dirty="0"/>
+              <a:t>Created a simulation environment to predict statistical distribution of future snowfall</a:t>
+            </a:r>
+          </a:p>
+          <a:p>
+            <a:endParaRPr lang="en-US" dirty="0"/>
+          </a:p>
+          <a:p>
+            <a:r>
+              <a:rPr lang="en-US" dirty="0"/>
+              <a:t>Framework could be extended to other geographic regions</a:t>
+            </a:r>
+          </a:p>
+        </p:txBody>
+      </p:sp>
+      <p:sp>
+        <p:nvSpPr>
+          <p:cNvPr id="4" name="Slide Number Placeholder 3"/>
+          <p:cNvSpPr>
+            <a:spLocks noGrp="1"/>
+          </p:cNvSpPr>
+          <p:nvPr>
+            <p:ph type="sldNum" sz="quarter" idx="12"/>
+          </p:nvPr>
+        </p:nvSpPr>
+        <p:spPr/>
+        <p:txBody>
+          <a:bodyPr/>
+          <a:lstStyle/>
+          <a:p>
+            <a:fld id="{A4DAB268-5651-8449-B4FF-0C1906E4DCE1}" type="slidenum">
+              <a:rPr lang="en-US" smtClean="0"/>
+              <a:t>13</a:t>
+            </a:fld>
+            <a:endParaRPr lang="en-US"/>
+          </a:p>
+        </p:txBody>
+      </p:sp>
+    </p:spTree>
+    <p:extLst>
+      <p:ext uri="{BB962C8B-B14F-4D97-AF65-F5344CB8AC3E}">
+        <p14:creationId xmlns:p14="http://schemas.microsoft.com/office/powerpoint/2010/main" val="4196977601"/>
+      </p:ext>
+    </p:extLst>
+  </p:cSld>
+  <p:clrMapOvr>
+    <a:masterClrMapping/>
+  </p:clrMapOvr>
+</p:sld>
+</file>
+
+<file path=ppt/slides/slide14.xml><?xml version="1.0" encoding="utf-8"?>
+<p:sld xmlns:a="http://schemas.openxmlformats.org/drawingml/2006/main" xmlns:r="http://schemas.openxmlformats.org/officeDocument/2006/relationships" xmlns:p="http://schemas.openxmlformats.org/presentationml/2006/main">
+  <p:cSld>
+    <p:spTree>
+      <p:nvGrpSpPr>
+        <p:cNvPr id="1" name=""/>
+        <p:cNvGrpSpPr/>
+        <p:nvPr/>
+      </p:nvGrpSpPr>
+      <p:grpSpPr>
+        <a:xfrm>
+          <a:off x="0" y="0"/>
+          <a:ext cx="0" cy="0"/>
+          <a:chOff x="0" y="0"/>
+          <a:chExt cx="0" cy="0"/>
+        </a:xfrm>
+      </p:grpSpPr>
+      <p:sp>
+        <p:nvSpPr>
+          <p:cNvPr id="2" name="Title 1"/>
+          <p:cNvSpPr>
+            <a:spLocks noGrp="1"/>
+          </p:cNvSpPr>
+          <p:nvPr>
+            <p:ph type="title"/>
+          </p:nvPr>
+        </p:nvSpPr>
+        <p:spPr/>
+        <p:txBody>
+          <a:bodyPr/>
+          <a:lstStyle/>
+          <a:p>
+            <a:r>
+              <a:rPr lang="en-US" dirty="0"/>
+              <a:t>Future Work</a:t>
+            </a:r>
+          </a:p>
+        </p:txBody>
+      </p:sp>
+      <p:sp>
+        <p:nvSpPr>
+          <p:cNvPr id="3" name="Content Placeholder 2"/>
+          <p:cNvSpPr>
+            <a:spLocks noGrp="1"/>
+          </p:cNvSpPr>
+          <p:nvPr>
+            <p:ph idx="1"/>
+          </p:nvPr>
+        </p:nvSpPr>
+        <p:spPr>
+          <a:xfrm>
+            <a:off x="838198" y="1644871"/>
+            <a:ext cx="10515599" cy="3870104"/>
+          </a:xfrm>
+        </p:spPr>
+        <p:txBody>
+          <a:bodyPr>
+            <a:normAutofit fontScale="92500" lnSpcReduction="20000"/>
+          </a:bodyPr>
+          <a:lstStyle/>
+          <a:p>
+            <a:r>
+              <a:rPr lang="en-US" dirty="0"/>
+              <a:t>Time series forecasting</a:t>
+            </a:r>
+          </a:p>
+          <a:p>
+            <a:pPr lvl="1"/>
+            <a:r>
+              <a:rPr lang="en-US" dirty="0"/>
+              <a:t>Impose physical constraints on samples</a:t>
+            </a:r>
+          </a:p>
+          <a:p>
+            <a:pPr lvl="1"/>
+            <a:r>
+              <a:rPr lang="en-US" dirty="0"/>
+              <a:t>Do not assume feature independence</a:t>
+            </a:r>
+          </a:p>
+          <a:p>
+            <a:pPr lvl="1"/>
+            <a:endParaRPr lang="en-US" dirty="0"/>
+          </a:p>
+          <a:p>
+            <a:r>
+              <a:rPr lang="en-US" dirty="0"/>
+              <a:t>Neural network</a:t>
+            </a:r>
+          </a:p>
+          <a:p>
+            <a:pPr lvl="1"/>
+            <a:r>
+              <a:rPr lang="en-US" dirty="0"/>
+              <a:t>Optimize structure of NN</a:t>
+            </a:r>
+          </a:p>
+          <a:p>
+            <a:pPr lvl="1"/>
+            <a:r>
+              <a:rPr lang="en-US" dirty="0"/>
+              <a:t>Optimize hyperparameter tuning</a:t>
+            </a:r>
+          </a:p>
+          <a:p>
+            <a:pPr lvl="1"/>
+            <a:endParaRPr lang="en-US" dirty="0"/>
+          </a:p>
+          <a:p>
+            <a:r>
+              <a:rPr lang="en-US" dirty="0"/>
+              <a:t>Simulation</a:t>
+            </a:r>
+          </a:p>
+          <a:p>
+            <a:pPr lvl="1"/>
+            <a:r>
+              <a:rPr lang="en-US" dirty="0"/>
+              <a:t>Run simulation on other Vermont towns</a:t>
+            </a:r>
+          </a:p>
+          <a:p>
+            <a:pPr lvl="1"/>
+            <a:r>
+              <a:rPr lang="en-US" dirty="0"/>
+              <a:t>Run simulation with more historical data (i.e., 50 years) and propagate further into the future (i.e., 10 years)</a:t>
+            </a:r>
+          </a:p>
+        </p:txBody>
+      </p:sp>
+      <p:sp>
+        <p:nvSpPr>
+          <p:cNvPr id="4" name="Slide Number Placeholder 3"/>
+          <p:cNvSpPr>
+            <a:spLocks noGrp="1"/>
+          </p:cNvSpPr>
+          <p:nvPr>
+            <p:ph type="sldNum" sz="quarter" idx="12"/>
+          </p:nvPr>
+        </p:nvSpPr>
+        <p:spPr/>
+        <p:txBody>
+          <a:bodyPr/>
+          <a:lstStyle/>
+          <a:p>
+            <a:fld id="{A4DAB268-5651-8449-B4FF-0C1906E4DCE1}" type="slidenum">
+              <a:rPr lang="en-US" smtClean="0"/>
+              <a:t>14</a:t>
+            </a:fld>
+            <a:endParaRPr lang="en-US"/>
+          </a:p>
+        </p:txBody>
+      </p:sp>
+    </p:spTree>
+    <p:extLst>
+      <p:ext uri="{BB962C8B-B14F-4D97-AF65-F5344CB8AC3E}">
+        <p14:creationId xmlns:p14="http://schemas.microsoft.com/office/powerpoint/2010/main" val="1138634031"/>
+      </p:ext>
+    </p:extLst>
+  </p:cSld>
+  <p:clrMapOvr>
+    <a:masterClrMapping/>
+  </p:clrMapOvr>
+</p:sld>
+</file>
+
+<file path=ppt/slides/slide15.xml><?xml version="1.0" encoding="utf-8"?>
+<p:sld xmlns:a="http://schemas.openxmlformats.org/drawingml/2006/main" xmlns:r="http://schemas.openxmlformats.org/officeDocument/2006/relationships" xmlns:p="http://schemas.openxmlformats.org/presentationml/2006/main">
+  <p:cSld>
+    <p:spTree>
+      <p:nvGrpSpPr>
+        <p:cNvPr id="1" name=""/>
+        <p:cNvGrpSpPr/>
+        <p:nvPr/>
+      </p:nvGrpSpPr>
+      <p:grpSpPr>
+        <a:xfrm>
+          <a:off x="0" y="0"/>
+          <a:ext cx="0" cy="0"/>
+          <a:chOff x="0" y="0"/>
+          <a:chExt cx="0" cy="0"/>
+        </a:xfrm>
+      </p:grpSpPr>
+      <p:sp>
+        <p:nvSpPr>
+          <p:cNvPr id="2" name="Title 1"/>
+          <p:cNvSpPr>
+            <a:spLocks noGrp="1"/>
+          </p:cNvSpPr>
+          <p:nvPr>
+            <p:ph type="title"/>
+          </p:nvPr>
+        </p:nvSpPr>
+        <p:spPr/>
+        <p:txBody>
+          <a:bodyPr/>
+          <a:lstStyle/>
+          <a:p>
+            <a:r>
+              <a:rPr lang="en-US" dirty="0"/>
+              <a:t>References</a:t>
+            </a:r>
+          </a:p>
+        </p:txBody>
+      </p:sp>
+      <p:sp>
+        <p:nvSpPr>
+          <p:cNvPr id="3" name="Content Placeholder 2"/>
+          <p:cNvSpPr>
+            <a:spLocks noGrp="1"/>
+          </p:cNvSpPr>
+          <p:nvPr>
+            <p:ph idx="1"/>
+          </p:nvPr>
+        </p:nvSpPr>
+        <p:spPr>
+          <a:xfrm>
+            <a:off x="838200" y="1487702"/>
+            <a:ext cx="11119338" cy="4541618"/>
+          </a:xfrm>
+        </p:spPr>
+        <p:txBody>
+          <a:bodyPr>
+            <a:normAutofit fontScale="55000" lnSpcReduction="20000"/>
           </a:bodyPr>
           <a:lstStyle/>
           <a:p>
@@ -4475,64 +5223,14 @@
               <a:t>[8] </a:t>
             </a:r>
             <a:r>
-              <a:rPr lang="en-US" b="0" i="0" dirty="0" err="1">
+              <a:rPr lang="en-US" b="0" i="0" dirty="0">
                 <a:solidFill>
                   <a:srgbClr val="000000"/>
                 </a:solidFill>
                 <a:effectLst/>
                 <a:latin typeface="helvetica-w01-roman"/>
               </a:rPr>
-              <a:t>DeepAI</a:t>
-            </a:r>
-            <a:r>
-              <a:rPr lang="en-US" b="0" i="0" dirty="0">
-                <a:solidFill>
-                  <a:srgbClr val="000000"/>
-                </a:solidFill>
-                <a:effectLst/>
-                <a:latin typeface="helvetica-w01-roman"/>
-              </a:rPr>
-              <a:t>. “Feed Forward Neural Network.” </a:t>
-            </a:r>
-            <a:r>
-              <a:rPr lang="en-US" b="0" i="0" dirty="0" err="1">
-                <a:solidFill>
-                  <a:srgbClr val="000000"/>
-                </a:solidFill>
-                <a:effectLst/>
-                <a:latin typeface="helvetica-w01-roman"/>
-              </a:rPr>
-              <a:t>DeepAI</a:t>
-            </a:r>
-            <a:r>
-              <a:rPr lang="en-US" b="0" i="0" dirty="0">
-                <a:solidFill>
-                  <a:srgbClr val="000000"/>
-                </a:solidFill>
-                <a:effectLst/>
-                <a:latin typeface="helvetica-w01-roman"/>
-              </a:rPr>
-              <a:t>, </a:t>
-            </a:r>
-            <a:r>
-              <a:rPr lang="en-US" b="0" i="0" dirty="0" err="1">
-                <a:solidFill>
-                  <a:srgbClr val="000000"/>
-                </a:solidFill>
-                <a:effectLst/>
-                <a:latin typeface="helvetica-w01-roman"/>
-              </a:rPr>
-              <a:t>DeepAI</a:t>
-            </a:r>
-            <a:r>
-              <a:rPr lang="en-US" b="0" i="0" dirty="0">
-                <a:solidFill>
-                  <a:srgbClr val="000000"/>
-                </a:solidFill>
-                <a:effectLst/>
-                <a:latin typeface="helvetica-w01-roman"/>
-              </a:rPr>
-              <a:t>, 17 May 2019, </a:t>
+              <a:t> Krieger, Mitchell. “Time Series Analysis with Facebook Prophet: How It Works and How to Use It.” Medium, Towards Data Science, 2 Feb. 2022, </a:t>
             </a:r>
             <a:r>
               <a:rPr lang="en-US" b="0" i="0" u="none" strike="noStrike" dirty="0">
@@ -4540,7 +5238,56 @@
                 <a:latin typeface="helvetica-w01-roman"/>
                 <a:hlinkClick r:id="rId9"/>
               </a:rPr>
-              <a:t>https://deepai.org/machine-learning-glossary-and-terms/feed-forward-neural-network.</a:t>
+              <a:t>https://towardsdatascience.com/time-series-analysis-with-facebook-prophet-how-it-works-and-how-to-use-it-f15ecf2c0e3a.</a:t>
+            </a:r>
+            <a:endParaRPr lang="en-US" dirty="0">
+              <a:latin typeface="helvetica-w01-roman"/>
+            </a:endParaRPr>
+          </a:p>
+          <a:p>
+            <a:r>
+              <a:rPr lang="en-US" dirty="0">
+                <a:latin typeface="helvetica-w01-roman"/>
+              </a:rPr>
+              <a:t>[9] </a:t>
+            </a:r>
+            <a:r>
+              <a:rPr lang="en-US" b="0" i="0" dirty="0">
+                <a:solidFill>
+                  <a:srgbClr val="000000"/>
+                </a:solidFill>
+                <a:effectLst/>
+                <a:latin typeface="helvetica-w01-roman"/>
+              </a:rPr>
+              <a:t>“Introduction.” </a:t>
+            </a:r>
+            <a:r>
+              <a:rPr lang="en-US" b="0" i="0" dirty="0" err="1">
+                <a:solidFill>
+                  <a:srgbClr val="000000"/>
+                </a:solidFill>
+                <a:effectLst/>
+                <a:latin typeface="helvetica-w01-roman"/>
+              </a:rPr>
+              <a:t>PyData</a:t>
+            </a:r>
+            <a:r>
+              <a:rPr lang="en-US" b="0" i="0" dirty="0">
+                <a:solidFill>
+                  <a:srgbClr val="000000"/>
+                </a:solidFill>
+                <a:effectLst/>
+                <a:latin typeface="helvetica-w01-roman"/>
+              </a:rPr>
+              <a:t>, </a:t>
+            </a:r>
+            <a:r>
+              <a:rPr lang="en-US" b="0" i="0" u="none" strike="noStrike" dirty="0">
+                <a:effectLst/>
+                <a:latin typeface="helvetica-w01-roman"/>
+                <a:hlinkClick r:id="rId10"/>
+              </a:rPr>
+              <a:t>https://pydata.org/amsterdam2019/schedule/presentation/6/build-facebooks-prophet-in-pymc3-bayesian-time-series-analyis-with-generalized-additive-models/.</a:t>
             </a:r>
             <a:endParaRPr lang="en-US" b="0" i="0" u="none" strike="noStrike" dirty="0">
               <a:effectLst/>
@@ -4552,7 +5299,17 @@
               <a:rPr lang="en-US" dirty="0">
                 <a:latin typeface="helvetica-w01-roman"/>
               </a:rPr>
-              <a:t>[9] </a:t>
+              <a:t>[10] </a:t>
+            </a:r>
+            <a:r>
+              <a:rPr lang="en-US" b="0" i="0" dirty="0" err="1">
+                <a:solidFill>
+                  <a:srgbClr val="000000"/>
+                </a:solidFill>
+                <a:effectLst/>
+                <a:latin typeface="helvetica-w01-roman"/>
+              </a:rPr>
+              <a:t>DeepAI</a:t>
             </a:r>
             <a:r>
               <a:rPr lang="en-US" b="0" i="0" dirty="0">
@@ -4562,65 +5319,65 @@
                 <a:effectLst/>
                 <a:latin typeface="helvetica-w01-roman"/>
               </a:rPr>
-              <a:t> Krieger, Mitchell. “Time Series Analysis with Facebook Prophet: How It Works and How to Use It.” Medium, Towards Data Science, 2 Feb. 2022, </a:t>
+              <a:t>. “Feed Forward Neural Network.” </a:t>
+            </a:r>
+            <a:r>
+              <a:rPr lang="en-US" b="0" i="0" dirty="0" err="1">
+                <a:solidFill>
+                  <a:srgbClr val="000000"/>
+                </a:solidFill>
+                <a:effectLst/>
+                <a:latin typeface="helvetica-w01-roman"/>
+              </a:rPr>
+              <a:t>DeepAI</a:t>
+            </a:r>
+            <a:r>
+              <a:rPr lang="en-US" b="0" i="0" dirty="0">
+                <a:solidFill>
+                  <a:srgbClr val="000000"/>
+                </a:solidFill>
+                <a:effectLst/>
+                <a:latin typeface="helvetica-w01-roman"/>
+              </a:rPr>
+              <a:t>, </a:t>
+            </a:r>
+            <a:r>
+              <a:rPr lang="en-US" b="0" i="0" dirty="0" err="1">
+                <a:solidFill>
+                  <a:srgbClr val="000000"/>
+                </a:solidFill>
+                <a:effectLst/>
+                <a:latin typeface="helvetica-w01-roman"/>
+              </a:rPr>
+              <a:t>DeepAI</a:t>
+            </a:r>
+            <a:r>
+              <a:rPr lang="en-US" b="0" i="0" dirty="0">
+                <a:solidFill>
+                  <a:srgbClr val="000000"/>
+                </a:solidFill>
+                <a:effectLst/>
+                <a:latin typeface="helvetica-w01-roman"/>
+              </a:rPr>
+              <a:t>, 17 May 2019, </a:t>
             </a:r>
             <a:r>
               <a:rPr lang="en-US" b="0" i="0" u="none" strike="noStrike" dirty="0">
                 <a:effectLst/>
                 <a:latin typeface="helvetica-w01-roman"/>
-                <a:hlinkClick r:id="rId10"/>
-              </a:rPr>
-              <a:t>https://towardsdatascience.com/time-series-analysis-with-facebook-prophet-how-it-works-and-how-to-use-it-f15ecf2c0e3a.</a:t>
-            </a:r>
-            <a:endParaRPr lang="en-US" dirty="0">
+                <a:hlinkClick r:id="rId11"/>
+              </a:rPr>
+              <a:t>https://deepai.org/machine-learning-glossary-and-terms/feed-forward-neural-network.</a:t>
+            </a:r>
+            <a:endParaRPr lang="en-US" b="0" i="0" u="none" strike="noStrike" dirty="0">
+              <a:effectLst/>
               <a:latin typeface="helvetica-w01-roman"/>
             </a:endParaRPr>
           </a:p>
           <a:p>
-            <a:r>
-              <a:rPr lang="en-US" dirty="0">
-                <a:latin typeface="helvetica-w01-roman"/>
-              </a:rPr>
-              <a:t>[10] </a:t>
-            </a:r>
-            <a:r>
-              <a:rPr lang="en-US" b="0" i="0" dirty="0">
-                <a:solidFill>
-                  <a:srgbClr val="000000"/>
-                </a:solidFill>
-                <a:effectLst/>
-                <a:latin typeface="helvetica-w01-roman"/>
-              </a:rPr>
-              <a:t>“Introduction.” </a:t>
-            </a:r>
-            <a:r>
-              <a:rPr lang="en-US" b="0" i="0" dirty="0" err="1">
-                <a:solidFill>
-                  <a:srgbClr val="000000"/>
-                </a:solidFill>
-                <a:effectLst/>
-                <a:latin typeface="helvetica-w01-roman"/>
-              </a:rPr>
-              <a:t>PyData</a:t>
-            </a:r>
-            <a:r>
-              <a:rPr lang="en-US" b="0" i="0" dirty="0">
-                <a:solidFill>
-                  <a:srgbClr val="000000"/>
-                </a:solidFill>
-                <a:effectLst/>
-                <a:latin typeface="helvetica-w01-roman"/>
-              </a:rPr>
-              <a:t>, </a:t>
-            </a:r>
-            <a:r>
-              <a:rPr lang="en-US" b="0" i="0" u="none" strike="noStrike" dirty="0">
-                <a:effectLst/>
-                <a:latin typeface="helvetica-w01-roman"/>
-                <a:hlinkClick r:id="rId11"/>
-              </a:rPr>
-              <a:t>https://pydata.org/amsterdam2019/schedule/presentation/6/build-facebooks-prophet-in-pymc3-bayesian-time-series-analyis-with-generalized-additive-models/.</a:t>
-            </a:r>
+            <a:pPr marL="0" indent="0">
+              <a:buNone/>
+            </a:pPr>
             <a:endParaRPr lang="en-US" dirty="0"/>
           </a:p>
           <a:p>
@@ -4645,7 +5402,7 @@
           <a:p>
             <a:fld id="{A4DAB268-5651-8449-B4FF-0C1906E4DCE1}" type="slidenum">
               <a:rPr lang="en-US" smtClean="0"/>
-              <a:t>12</a:t>
+              <a:t>15</a:t>
             </a:fld>
             <a:endParaRPr lang="en-US"/>
           </a:p>
@@ -6082,6 +6839,445 @@
           <a:p>
             <a:r>
               <a:rPr lang="en-US" dirty="0"/>
+              <a:t>Method: Time Series Forecasting</a:t>
+            </a:r>
+          </a:p>
+        </p:txBody>
+      </p:sp>
+      <p:sp>
+        <p:nvSpPr>
+          <p:cNvPr id="3" name="Content Placeholder 2"/>
+          <p:cNvSpPr>
+            <a:spLocks noGrp="1"/>
+          </p:cNvSpPr>
+          <p:nvPr>
+            <p:ph idx="1"/>
+          </p:nvPr>
+        </p:nvSpPr>
+        <p:spPr>
+          <a:xfrm>
+            <a:off x="838199" y="1644871"/>
+            <a:ext cx="10220325" cy="3870104"/>
+          </a:xfrm>
+        </p:spPr>
+        <p:txBody>
+          <a:bodyPr>
+            <a:normAutofit fontScale="85000" lnSpcReduction="20000"/>
+          </a:bodyPr>
+          <a:lstStyle/>
+          <a:p>
+            <a:r>
+              <a:rPr lang="en-US" b="0" i="0" dirty="0">
+                <a:solidFill>
+                  <a:srgbClr val="000000"/>
+                </a:solidFill>
+                <a:effectLst/>
+                <a:latin typeface="helvetica-w01-roman"/>
+              </a:rPr>
+              <a:t>Time series forecasting is a means of predicting future time series data from historical time series data</a:t>
+            </a:r>
+          </a:p>
+          <a:p>
+            <a:pPr lvl="1"/>
+            <a:r>
+              <a:rPr lang="en-US" b="0" i="0" dirty="0">
+                <a:solidFill>
+                  <a:srgbClr val="000000"/>
+                </a:solidFill>
+                <a:effectLst/>
+                <a:latin typeface="helvetica-w01-roman"/>
+              </a:rPr>
+              <a:t>Need future weather data to predict snowfall</a:t>
+            </a:r>
+          </a:p>
+          <a:p>
+            <a:endParaRPr lang="en-US" dirty="0">
+              <a:solidFill>
+                <a:srgbClr val="000000"/>
+              </a:solidFill>
+              <a:latin typeface="helvetica-w01-roman"/>
+            </a:endParaRPr>
+          </a:p>
+          <a:p>
+            <a:r>
+              <a:rPr lang="en-US" dirty="0">
+                <a:solidFill>
+                  <a:srgbClr val="000000"/>
+                </a:solidFill>
+                <a:latin typeface="helvetica-w01-roman"/>
+              </a:rPr>
+              <a:t>Time series forecasting was completed </a:t>
+            </a:r>
+            <a:r>
+              <a:rPr lang="en-US" i="1" dirty="0">
+                <a:solidFill>
+                  <a:srgbClr val="000000"/>
+                </a:solidFill>
+                <a:latin typeface="helvetica-w01-roman"/>
+              </a:rPr>
+              <a:t>independently </a:t>
+            </a:r>
+            <a:r>
+              <a:rPr lang="en-US" dirty="0">
+                <a:solidFill>
+                  <a:srgbClr val="000000"/>
+                </a:solidFill>
+                <a:latin typeface="helvetica-w01-roman"/>
+              </a:rPr>
+              <a:t>for each of the 13 input features</a:t>
+            </a:r>
+          </a:p>
+          <a:p>
+            <a:pPr lvl="1"/>
+            <a:r>
+              <a:rPr lang="en-US" dirty="0">
+                <a:solidFill>
+                  <a:srgbClr val="000000"/>
+                </a:solidFill>
+                <a:latin typeface="helvetica-w01-roman"/>
+              </a:rPr>
+              <a:t>Assumption: the features do not depend on each other (this is a major assumption, but given time/resource constraints is necessary)</a:t>
+            </a:r>
+          </a:p>
+          <a:p>
+            <a:pPr lvl="1"/>
+            <a:endParaRPr lang="en-US" dirty="0">
+              <a:solidFill>
+                <a:srgbClr val="000000"/>
+              </a:solidFill>
+              <a:latin typeface="helvetica-w01-roman"/>
+            </a:endParaRPr>
+          </a:p>
+          <a:p>
+            <a:r>
+              <a:rPr lang="en-US" dirty="0">
+                <a:solidFill>
+                  <a:srgbClr val="000000"/>
+                </a:solidFill>
+                <a:latin typeface="helvetica-w01-roman"/>
+              </a:rPr>
+              <a:t>Used Facebook’s Prophet algorithm [8]</a:t>
+            </a:r>
+          </a:p>
+          <a:p>
+            <a:pPr lvl="1"/>
+            <a:r>
+              <a:rPr lang="en-US" b="0" i="0" dirty="0">
+                <a:solidFill>
+                  <a:srgbClr val="000000"/>
+                </a:solidFill>
+                <a:effectLst/>
+                <a:latin typeface="helvetica-w01-roman"/>
+              </a:rPr>
+              <a:t>Generalized Additional Model that uses a Bayesian approach to quantify uncertainty [9]</a:t>
+            </a:r>
+          </a:p>
+        </p:txBody>
+      </p:sp>
+      <p:sp>
+        <p:nvSpPr>
+          <p:cNvPr id="4" name="Slide Number Placeholder 3"/>
+          <p:cNvSpPr>
+            <a:spLocks noGrp="1"/>
+          </p:cNvSpPr>
+          <p:nvPr>
+            <p:ph type="sldNum" sz="quarter" idx="12"/>
+          </p:nvPr>
+        </p:nvSpPr>
+        <p:spPr/>
+        <p:txBody>
+          <a:bodyPr/>
+          <a:lstStyle/>
+          <a:p>
+            <a:fld id="{A4DAB268-5651-8449-B4FF-0C1906E4DCE1}" type="slidenum">
+              <a:rPr lang="en-US" smtClean="0"/>
+              <a:t>7</a:t>
+            </a:fld>
+            <a:endParaRPr lang="en-US"/>
+          </a:p>
+        </p:txBody>
+      </p:sp>
+    </p:spTree>
+    <p:extLst>
+      <p:ext uri="{BB962C8B-B14F-4D97-AF65-F5344CB8AC3E}">
+        <p14:creationId xmlns:p14="http://schemas.microsoft.com/office/powerpoint/2010/main" val="3205473684"/>
+      </p:ext>
+    </p:extLst>
+  </p:cSld>
+  <p:clrMapOvr>
+    <a:masterClrMapping/>
+  </p:clrMapOvr>
+</p:sld>
+</file>
+
+<file path=ppt/slides/slide8.xml><?xml version="1.0" encoding="utf-8"?>
+<p:sld xmlns:a="http://schemas.openxmlformats.org/drawingml/2006/main" xmlns:r="http://schemas.openxmlformats.org/officeDocument/2006/relationships" xmlns:p="http://schemas.openxmlformats.org/presentationml/2006/main">
+  <p:cSld>
+    <p:spTree>
+      <p:nvGrpSpPr>
+        <p:cNvPr id="1" name=""/>
+        <p:cNvGrpSpPr/>
+        <p:nvPr/>
+      </p:nvGrpSpPr>
+      <p:grpSpPr>
+        <a:xfrm>
+          <a:off x="0" y="0"/>
+          <a:ext cx="0" cy="0"/>
+          <a:chOff x="0" y="0"/>
+          <a:chExt cx="0" cy="0"/>
+        </a:xfrm>
+      </p:grpSpPr>
+      <p:sp>
+        <p:nvSpPr>
+          <p:cNvPr id="2" name="Title 1"/>
+          <p:cNvSpPr>
+            <a:spLocks noGrp="1"/>
+          </p:cNvSpPr>
+          <p:nvPr>
+            <p:ph type="title"/>
+          </p:nvPr>
+        </p:nvSpPr>
+        <p:spPr/>
+        <p:txBody>
+          <a:bodyPr/>
+          <a:lstStyle/>
+          <a:p>
+            <a:r>
+              <a:rPr lang="en-US" dirty="0"/>
+              <a:t>Results: Time Series Forecasting</a:t>
+            </a:r>
+          </a:p>
+        </p:txBody>
+      </p:sp>
+      <p:sp>
+        <p:nvSpPr>
+          <p:cNvPr id="3" name="Content Placeholder 2"/>
+          <p:cNvSpPr>
+            <a:spLocks noGrp="1"/>
+          </p:cNvSpPr>
+          <p:nvPr>
+            <p:ph idx="1"/>
+          </p:nvPr>
+        </p:nvSpPr>
+        <p:spPr>
+          <a:xfrm>
+            <a:off x="838200" y="1644870"/>
+            <a:ext cx="5434013" cy="3756958"/>
+          </a:xfrm>
+        </p:spPr>
+        <p:txBody>
+          <a:bodyPr>
+            <a:normAutofit fontScale="85000" lnSpcReduction="10000"/>
+          </a:bodyPr>
+          <a:lstStyle/>
+          <a:p>
+            <a:r>
+              <a:rPr lang="en-US" b="0" i="0" dirty="0">
+                <a:solidFill>
+                  <a:srgbClr val="000000"/>
+                </a:solidFill>
+                <a:effectLst/>
+                <a:latin typeface="helvetica-w01-roman"/>
+              </a:rPr>
+              <a:t>Model captures seasonal trends</a:t>
+            </a:r>
+          </a:p>
+          <a:p>
+            <a:endParaRPr lang="en-US" dirty="0">
+              <a:solidFill>
+                <a:srgbClr val="000000"/>
+              </a:solidFill>
+              <a:latin typeface="helvetica-w01-roman"/>
+            </a:endParaRPr>
+          </a:p>
+          <a:p>
+            <a:r>
+              <a:rPr lang="en-US" dirty="0">
+                <a:solidFill>
+                  <a:srgbClr val="000000"/>
+                </a:solidFill>
+                <a:latin typeface="helvetica-w01-roman"/>
+              </a:rPr>
+              <a:t>Uncertainty increases as time horizon from training data increases</a:t>
+            </a:r>
+          </a:p>
+          <a:p>
+            <a:endParaRPr lang="en-US" dirty="0">
+              <a:solidFill>
+                <a:srgbClr val="000000"/>
+              </a:solidFill>
+              <a:latin typeface="helvetica-w01-roman"/>
+            </a:endParaRPr>
+          </a:p>
+          <a:p>
+            <a:r>
+              <a:rPr lang="en-US" dirty="0">
+                <a:solidFill>
+                  <a:srgbClr val="000000"/>
+                </a:solidFill>
+                <a:latin typeface="helvetica-w01-roman"/>
+              </a:rPr>
+              <a:t>Model may make non-physical predictions</a:t>
+            </a:r>
+          </a:p>
+          <a:p>
+            <a:pPr lvl="1"/>
+            <a:r>
+              <a:rPr lang="en-US" dirty="0">
+                <a:solidFill>
+                  <a:srgbClr val="000000"/>
+                </a:solidFill>
+                <a:latin typeface="helvetica-w01-roman"/>
+              </a:rPr>
+              <a:t>Why? Because linear fit was used, which does not allow for constraints (logistic fit can impose constraints but drastically increases compute time)</a:t>
+            </a:r>
+            <a:endParaRPr lang="en-US" dirty="0"/>
+          </a:p>
+        </p:txBody>
+      </p:sp>
+      <p:sp>
+        <p:nvSpPr>
+          <p:cNvPr id="4" name="Slide Number Placeholder 3"/>
+          <p:cNvSpPr>
+            <a:spLocks noGrp="1"/>
+          </p:cNvSpPr>
+          <p:nvPr>
+            <p:ph type="sldNum" sz="quarter" idx="12"/>
+          </p:nvPr>
+        </p:nvSpPr>
+        <p:spPr/>
+        <p:txBody>
+          <a:bodyPr/>
+          <a:lstStyle/>
+          <a:p>
+            <a:fld id="{A4DAB268-5651-8449-B4FF-0C1906E4DCE1}" type="slidenum">
+              <a:rPr lang="en-US" smtClean="0"/>
+              <a:t>8</a:t>
+            </a:fld>
+            <a:endParaRPr lang="en-US"/>
+          </a:p>
+        </p:txBody>
+      </p:sp>
+      <p:sp>
+        <p:nvSpPr>
+          <p:cNvPr id="11" name="TextBox 10">
+            <a:extLst>
+              <a:ext uri="{FF2B5EF4-FFF2-40B4-BE49-F238E27FC236}">
+                <a16:creationId xmlns:a16="http://schemas.microsoft.com/office/drawing/2014/main" id="{42859841-FDDE-FBD2-3ED0-2C0168AD90C1}"/>
+              </a:ext>
+            </a:extLst>
+          </p:cNvPr>
+          <p:cNvSpPr txBox="1"/>
+          <p:nvPr/>
+        </p:nvSpPr>
+        <p:spPr>
+          <a:xfrm>
+            <a:off x="6272212" y="5279191"/>
+            <a:ext cx="5919787" cy="307777"/>
+          </a:xfrm>
+          <a:prstGeom prst="rect">
+            <a:avLst/>
+          </a:prstGeom>
+          <a:noFill/>
+        </p:spPr>
+        <p:txBody>
+          <a:bodyPr wrap="square" rtlCol="0">
+            <a:spAutoFit/>
+          </a:bodyPr>
+          <a:lstStyle/>
+          <a:p>
+            <a:pPr algn="ctr"/>
+            <a:r>
+              <a:rPr lang="en-US" sz="1400" b="0" i="0" dirty="0">
+                <a:solidFill>
+                  <a:srgbClr val="000000"/>
+                </a:solidFill>
+                <a:effectLst/>
+                <a:latin typeface="helvetica-w01-roman"/>
+              </a:rPr>
+              <a:t>Figure 6: time series forecasting for apparent temperature</a:t>
+            </a:r>
+            <a:endParaRPr lang="en-US" sz="1400" dirty="0"/>
+          </a:p>
+        </p:txBody>
+      </p:sp>
+      <p:pic>
+        <p:nvPicPr>
+          <p:cNvPr id="6" name="Picture 5" descr="Chart&#10;&#10;Description automatically generated">
+            <a:extLst>
+              <a:ext uri="{FF2B5EF4-FFF2-40B4-BE49-F238E27FC236}">
+                <a16:creationId xmlns:a16="http://schemas.microsoft.com/office/drawing/2014/main" id="{31D9236F-0415-BEF2-4228-43EDC54E1E29}"/>
+              </a:ext>
+            </a:extLst>
+          </p:cNvPr>
+          <p:cNvPicPr>
+            <a:picLocks noChangeAspect="1"/>
+          </p:cNvPicPr>
+          <p:nvPr/>
+        </p:nvPicPr>
+        <p:blipFill>
+          <a:blip r:embed="rId2"/>
+          <a:stretch>
+            <a:fillRect/>
+          </a:stretch>
+        </p:blipFill>
+        <p:spPr>
+          <a:xfrm>
+            <a:off x="6272213" y="1456172"/>
+            <a:ext cx="5567362" cy="3823019"/>
+          </a:xfrm>
+          <a:prstGeom prst="rect">
+            <a:avLst/>
+          </a:prstGeom>
+        </p:spPr>
+      </p:pic>
+    </p:spTree>
+    <p:extLst>
+      <p:ext uri="{BB962C8B-B14F-4D97-AF65-F5344CB8AC3E}">
+        <p14:creationId xmlns:p14="http://schemas.microsoft.com/office/powerpoint/2010/main" val="2246261030"/>
+      </p:ext>
+    </p:extLst>
+  </p:cSld>
+  <p:clrMapOvr>
+    <a:masterClrMapping/>
+  </p:clrMapOvr>
+</p:sld>
+</file>
+
+<file path=ppt/slides/slide9.xml><?xml version="1.0" encoding="utf-8"?>
+<p:sld xmlns:a="http://schemas.openxmlformats.org/drawingml/2006/main" xmlns:r="http://schemas.openxmlformats.org/officeDocument/2006/relationships" xmlns:p="http://schemas.openxmlformats.org/presentationml/2006/main">
+  <p:cSld>
+    <p:spTree>
+      <p:nvGrpSpPr>
+        <p:cNvPr id="1" name=""/>
+        <p:cNvGrpSpPr/>
+        <p:nvPr/>
+      </p:nvGrpSpPr>
+      <p:grpSpPr>
+        <a:xfrm>
+          <a:off x="0" y="0"/>
+          <a:ext cx="0" cy="0"/>
+          <a:chOff x="0" y="0"/>
+          <a:chExt cx="0" cy="0"/>
+        </a:xfrm>
+      </p:grpSpPr>
+      <p:sp>
+        <p:nvSpPr>
+          <p:cNvPr id="2" name="Title 1"/>
+          <p:cNvSpPr>
+            <a:spLocks noGrp="1"/>
+          </p:cNvSpPr>
+          <p:nvPr>
+            <p:ph type="title"/>
+          </p:nvPr>
+        </p:nvSpPr>
+        <p:spPr/>
+        <p:txBody>
+          <a:bodyPr/>
+          <a:lstStyle/>
+          <a:p>
+            <a:r>
+              <a:rPr lang="en-US" dirty="0"/>
               <a:t>Method: Neural Networks</a:t>
             </a:r>
           </a:p>
@@ -6119,7 +7315,7 @@
                     <a:effectLst/>
                     <a:latin typeface="helvetica-w01-roman"/>
                   </a:rPr>
-                  <a:t>Using a feedforward neural network (FFNN) to predict snowfall based on 13 independent weather features</a:t>
+                  <a:t>Used a feedforward neural network (FFNN) to predict snowfall based on 13 independent weather features</a:t>
                 </a:r>
               </a:p>
               <a:p>
@@ -6343,7 +7539,7 @@
           <a:p>
             <a:fld id="{A4DAB268-5651-8449-B4FF-0C1906E4DCE1}" type="slidenum">
               <a:rPr lang="en-US" smtClean="0"/>
-              <a:t>7</a:t>
+              <a:t>9</a:t>
             </a:fld>
             <a:endParaRPr lang="en-US"/>
           </a:p>
@@ -6416,7 +7612,7 @@
                 <a:effectLst/>
                 <a:latin typeface="helvetica-w01-roman"/>
               </a:rPr>
-              <a:t>Figure 6: FFNN structure [8]</a:t>
+              <a:t>Figure 7: FFNN structure [10]</a:t>
             </a:r>
             <a:endParaRPr lang="en-US" sz="1400" dirty="0"/>
           </a:p>
@@ -6426,486 +7622,6 @@
     <p:extLst>
       <p:ext uri="{BB962C8B-B14F-4D97-AF65-F5344CB8AC3E}">
         <p14:creationId xmlns:p14="http://schemas.microsoft.com/office/powerpoint/2010/main" val="336816192"/>
-      </p:ext>
-    </p:extLst>
-  </p:cSld>
-  <p:clrMapOvr>
-    <a:masterClrMapping/>
-  </p:clrMapOvr>
-</p:sld>
-</file>
-
-<file path=ppt/slides/slide8.xml><?xml version="1.0" encoding="utf-8"?>
-<p:sld xmlns:a="http://schemas.openxmlformats.org/drawingml/2006/main" xmlns:r="http://schemas.openxmlformats.org/officeDocument/2006/relationships" xmlns:p="http://schemas.openxmlformats.org/presentationml/2006/main">
-  <p:cSld>
-    <p:spTree>
-      <p:nvGrpSpPr>
-        <p:cNvPr id="1" name=""/>
-        <p:cNvGrpSpPr/>
-        <p:nvPr/>
-      </p:nvGrpSpPr>
-      <p:grpSpPr>
-        <a:xfrm>
-          <a:off x="0" y="0"/>
-          <a:ext cx="0" cy="0"/>
-          <a:chOff x="0" y="0"/>
-          <a:chExt cx="0" cy="0"/>
-        </a:xfrm>
-      </p:grpSpPr>
-      <p:sp>
-        <p:nvSpPr>
-          <p:cNvPr id="2" name="Title 1"/>
-          <p:cNvSpPr>
-            <a:spLocks noGrp="1"/>
-          </p:cNvSpPr>
-          <p:nvPr>
-            <p:ph type="title"/>
-          </p:nvPr>
-        </p:nvSpPr>
-        <p:spPr/>
-        <p:txBody>
-          <a:bodyPr/>
-          <a:lstStyle/>
-          <a:p>
-            <a:r>
-              <a:rPr lang="en-US" dirty="0"/>
-              <a:t>Results: Neural Networks</a:t>
-            </a:r>
-          </a:p>
-        </p:txBody>
-      </p:sp>
-      <p:sp>
-        <p:nvSpPr>
-          <p:cNvPr id="3" name="Content Placeholder 2"/>
-          <p:cNvSpPr>
-            <a:spLocks noGrp="1"/>
-          </p:cNvSpPr>
-          <p:nvPr>
-            <p:ph idx="1"/>
-          </p:nvPr>
-        </p:nvSpPr>
-        <p:spPr>
-          <a:xfrm>
-            <a:off x="838200" y="1644870"/>
-            <a:ext cx="6705600" cy="1325563"/>
-          </a:xfrm>
-        </p:spPr>
-        <p:txBody>
-          <a:bodyPr>
-            <a:normAutofit fontScale="77500" lnSpcReduction="20000"/>
-          </a:bodyPr>
-          <a:lstStyle/>
-          <a:p>
-            <a:r>
-              <a:rPr lang="en-US" b="0" i="0" dirty="0">
-                <a:solidFill>
-                  <a:srgbClr val="000000"/>
-                </a:solidFill>
-                <a:effectLst/>
-                <a:latin typeface="helvetica-w01-roman"/>
-              </a:rPr>
-              <a:t>NN was trained for 1000 epochs</a:t>
-            </a:r>
-          </a:p>
-          <a:p>
-            <a:endParaRPr lang="en-US" dirty="0">
-              <a:solidFill>
-                <a:srgbClr val="000000"/>
-              </a:solidFill>
-              <a:latin typeface="helvetica-w01-roman"/>
-            </a:endParaRPr>
-          </a:p>
-          <a:p>
-            <a:r>
-              <a:rPr lang="en-US" dirty="0">
-                <a:solidFill>
-                  <a:srgbClr val="000000"/>
-                </a:solidFill>
-                <a:latin typeface="helvetica-w01-roman"/>
-              </a:rPr>
-              <a:t>Confusion matrix indicates imperfect performance</a:t>
-            </a:r>
-            <a:endParaRPr lang="en-US" dirty="0"/>
-          </a:p>
-        </p:txBody>
-      </p:sp>
-      <p:sp>
-        <p:nvSpPr>
-          <p:cNvPr id="4" name="Slide Number Placeholder 3"/>
-          <p:cNvSpPr>
-            <a:spLocks noGrp="1"/>
-          </p:cNvSpPr>
-          <p:nvPr>
-            <p:ph type="sldNum" sz="quarter" idx="12"/>
-          </p:nvPr>
-        </p:nvSpPr>
-        <p:spPr/>
-        <p:txBody>
-          <a:bodyPr/>
-          <a:lstStyle/>
-          <a:p>
-            <a:fld id="{A4DAB268-5651-8449-B4FF-0C1906E4DCE1}" type="slidenum">
-              <a:rPr lang="en-US" smtClean="0"/>
-              <a:t>8</a:t>
-            </a:fld>
-            <a:endParaRPr lang="en-US"/>
-          </a:p>
-        </p:txBody>
-      </p:sp>
-      <p:sp>
-        <p:nvSpPr>
-          <p:cNvPr id="8" name="TextBox 7">
-            <a:extLst>
-              <a:ext uri="{FF2B5EF4-FFF2-40B4-BE49-F238E27FC236}">
-                <a16:creationId xmlns:a16="http://schemas.microsoft.com/office/drawing/2014/main" id="{14DB306A-8480-9369-B1AF-47EA31B84458}"/>
-              </a:ext>
-            </a:extLst>
-          </p:cNvPr>
-          <p:cNvSpPr txBox="1"/>
-          <p:nvPr/>
-        </p:nvSpPr>
-        <p:spPr>
-          <a:xfrm>
-            <a:off x="7986713" y="5667478"/>
-            <a:ext cx="4205286" cy="307777"/>
-          </a:xfrm>
-          <a:prstGeom prst="rect">
-            <a:avLst/>
-          </a:prstGeom>
-          <a:noFill/>
-        </p:spPr>
-        <p:txBody>
-          <a:bodyPr wrap="square" rtlCol="0">
-            <a:spAutoFit/>
-          </a:bodyPr>
-          <a:lstStyle/>
-          <a:p>
-            <a:pPr algn="ctr"/>
-            <a:r>
-              <a:rPr lang="en-US" sz="1400" b="0" i="0" dirty="0">
-                <a:solidFill>
-                  <a:srgbClr val="000000"/>
-                </a:solidFill>
-                <a:effectLst/>
-                <a:latin typeface="helvetica-w01-roman"/>
-              </a:rPr>
-              <a:t>Figure 8: FFNN normalized confusion matrix</a:t>
-            </a:r>
-            <a:endParaRPr lang="en-US" sz="1400" dirty="0"/>
-          </a:p>
-        </p:txBody>
-      </p:sp>
-      <p:pic>
-        <p:nvPicPr>
-          <p:cNvPr id="7" name="Picture 6" descr="Chart, line chart&#10;&#10;Description automatically generated">
-            <a:extLst>
-              <a:ext uri="{FF2B5EF4-FFF2-40B4-BE49-F238E27FC236}">
-                <a16:creationId xmlns:a16="http://schemas.microsoft.com/office/drawing/2014/main" id="{4A673517-004D-2B19-59DB-1DBF8E9089F5}"/>
-              </a:ext>
-            </a:extLst>
-          </p:cNvPr>
-          <p:cNvPicPr>
-            <a:picLocks noChangeAspect="1"/>
-          </p:cNvPicPr>
-          <p:nvPr/>
-        </p:nvPicPr>
-        <p:blipFill>
-          <a:blip r:embed="rId2"/>
-          <a:stretch>
-            <a:fillRect/>
-          </a:stretch>
-        </p:blipFill>
-        <p:spPr>
-          <a:xfrm>
-            <a:off x="1827119" y="2984961"/>
-            <a:ext cx="3624553" cy="2547152"/>
-          </a:xfrm>
-          <a:prstGeom prst="rect">
-            <a:avLst/>
-          </a:prstGeom>
-        </p:spPr>
-      </p:pic>
-      <p:pic>
-        <p:nvPicPr>
-          <p:cNvPr id="10" name="Picture 9" descr="Table, calendar&#10;&#10;Description automatically generated">
-            <a:extLst>
-              <a:ext uri="{FF2B5EF4-FFF2-40B4-BE49-F238E27FC236}">
-                <a16:creationId xmlns:a16="http://schemas.microsoft.com/office/drawing/2014/main" id="{2E5B5441-B7C5-BD19-190D-001CE02105BF}"/>
-              </a:ext>
-            </a:extLst>
-          </p:cNvPr>
-          <p:cNvPicPr>
-            <a:picLocks noChangeAspect="1"/>
-          </p:cNvPicPr>
-          <p:nvPr/>
-        </p:nvPicPr>
-        <p:blipFill rotWithShape="1">
-          <a:blip r:embed="rId3"/>
-          <a:srcRect r="11723"/>
-          <a:stretch/>
-        </p:blipFill>
-        <p:spPr>
-          <a:xfrm>
-            <a:off x="7712758" y="228604"/>
-            <a:ext cx="4479241" cy="5512714"/>
-          </a:xfrm>
-          <a:prstGeom prst="rect">
-            <a:avLst/>
-          </a:prstGeom>
-        </p:spPr>
-      </p:pic>
-      <p:sp>
-        <p:nvSpPr>
-          <p:cNvPr id="11" name="TextBox 10">
-            <a:extLst>
-              <a:ext uri="{FF2B5EF4-FFF2-40B4-BE49-F238E27FC236}">
-                <a16:creationId xmlns:a16="http://schemas.microsoft.com/office/drawing/2014/main" id="{42859841-FDDE-FBD2-3ED0-2C0168AD90C1}"/>
-              </a:ext>
-            </a:extLst>
-          </p:cNvPr>
-          <p:cNvSpPr txBox="1"/>
-          <p:nvPr/>
-        </p:nvSpPr>
-        <p:spPr>
-          <a:xfrm>
-            <a:off x="1724026" y="5532113"/>
-            <a:ext cx="4205286" cy="307777"/>
-          </a:xfrm>
-          <a:prstGeom prst="rect">
-            <a:avLst/>
-          </a:prstGeom>
-          <a:noFill/>
-        </p:spPr>
-        <p:txBody>
-          <a:bodyPr wrap="square" rtlCol="0">
-            <a:spAutoFit/>
-          </a:bodyPr>
-          <a:lstStyle/>
-          <a:p>
-            <a:pPr algn="ctr"/>
-            <a:r>
-              <a:rPr lang="en-US" sz="1400" b="0" i="0" dirty="0">
-                <a:solidFill>
-                  <a:srgbClr val="000000"/>
-                </a:solidFill>
-                <a:effectLst/>
-                <a:latin typeface="helvetica-w01-roman"/>
-              </a:rPr>
-              <a:t>Figure 7: FFNN training loss</a:t>
-            </a:r>
-            <a:endParaRPr lang="en-US" sz="1400" dirty="0"/>
-          </a:p>
-        </p:txBody>
-      </p:sp>
-    </p:spTree>
-    <p:extLst>
-      <p:ext uri="{BB962C8B-B14F-4D97-AF65-F5344CB8AC3E}">
-        <p14:creationId xmlns:p14="http://schemas.microsoft.com/office/powerpoint/2010/main" val="1601318653"/>
-      </p:ext>
-    </p:extLst>
-  </p:cSld>
-  <p:clrMapOvr>
-    <a:masterClrMapping/>
-  </p:clrMapOvr>
-</p:sld>
-</file>
-
-<file path=ppt/slides/slide9.xml><?xml version="1.0" encoding="utf-8"?>
-<p:sld xmlns:a="http://schemas.openxmlformats.org/drawingml/2006/main" xmlns:r="http://schemas.openxmlformats.org/officeDocument/2006/relationships" xmlns:p="http://schemas.openxmlformats.org/presentationml/2006/main">
-  <p:cSld>
-    <p:spTree>
-      <p:nvGrpSpPr>
-        <p:cNvPr id="1" name=""/>
-        <p:cNvGrpSpPr/>
-        <p:nvPr/>
-      </p:nvGrpSpPr>
-      <p:grpSpPr>
-        <a:xfrm>
-          <a:off x="0" y="0"/>
-          <a:ext cx="0" cy="0"/>
-          <a:chOff x="0" y="0"/>
-          <a:chExt cx="0" cy="0"/>
-        </a:xfrm>
-      </p:grpSpPr>
-      <p:sp>
-        <p:nvSpPr>
-          <p:cNvPr id="2" name="Title 1"/>
-          <p:cNvSpPr>
-            <a:spLocks noGrp="1"/>
-          </p:cNvSpPr>
-          <p:nvPr>
-            <p:ph type="title"/>
-          </p:nvPr>
-        </p:nvSpPr>
-        <p:spPr/>
-        <p:txBody>
-          <a:bodyPr/>
-          <a:lstStyle/>
-          <a:p>
-            <a:r>
-              <a:rPr lang="en-US" dirty="0"/>
-              <a:t>Method: Time Series Forecasting</a:t>
-            </a:r>
-          </a:p>
-        </p:txBody>
-      </p:sp>
-      <p:sp>
-        <p:nvSpPr>
-          <p:cNvPr id="3" name="Content Placeholder 2"/>
-          <p:cNvSpPr>
-            <a:spLocks noGrp="1"/>
-          </p:cNvSpPr>
-          <p:nvPr>
-            <p:ph idx="1"/>
-          </p:nvPr>
-        </p:nvSpPr>
-        <p:spPr>
-          <a:xfrm>
-            <a:off x="838199" y="1644871"/>
-            <a:ext cx="10220325" cy="3870104"/>
-          </a:xfrm>
-        </p:spPr>
-        <p:txBody>
-          <a:bodyPr>
-            <a:normAutofit fontScale="85000" lnSpcReduction="20000"/>
-          </a:bodyPr>
-          <a:lstStyle/>
-          <a:p>
-            <a:r>
-              <a:rPr lang="en-US" b="0" i="0" dirty="0">
-                <a:solidFill>
-                  <a:srgbClr val="000000"/>
-                </a:solidFill>
-                <a:effectLst/>
-                <a:latin typeface="helvetica-w01-roman"/>
-              </a:rPr>
-              <a:t>Time series forecasting is a means of predicting future time series data from historical time series data</a:t>
-            </a:r>
-          </a:p>
-          <a:p>
-            <a:endParaRPr lang="en-US" dirty="0">
-              <a:solidFill>
-                <a:srgbClr val="000000"/>
-              </a:solidFill>
-              <a:latin typeface="helvetica-w01-roman"/>
-            </a:endParaRPr>
-          </a:p>
-          <a:p>
-            <a:r>
-              <a:rPr lang="en-US" dirty="0">
-                <a:solidFill>
-                  <a:srgbClr val="000000"/>
-                </a:solidFill>
-                <a:latin typeface="helvetica-w01-roman"/>
-              </a:rPr>
-              <a:t>Time series forecasting was completed </a:t>
-            </a:r>
-            <a:r>
-              <a:rPr lang="en-US" i="1" dirty="0">
-                <a:solidFill>
-                  <a:srgbClr val="000000"/>
-                </a:solidFill>
-                <a:latin typeface="helvetica-w01-roman"/>
-              </a:rPr>
-              <a:t>independently </a:t>
-            </a:r>
-            <a:r>
-              <a:rPr lang="en-US" dirty="0">
-                <a:solidFill>
-                  <a:srgbClr val="000000"/>
-                </a:solidFill>
-                <a:latin typeface="helvetica-w01-roman"/>
-              </a:rPr>
-              <a:t>for each of the 13 input features</a:t>
-            </a:r>
-          </a:p>
-          <a:p>
-            <a:pPr lvl="1"/>
-            <a:r>
-              <a:rPr lang="en-US" dirty="0">
-                <a:solidFill>
-                  <a:srgbClr val="000000"/>
-                </a:solidFill>
-                <a:latin typeface="helvetica-w01-roman"/>
-              </a:rPr>
-              <a:t>Assumption: the features do not depend on each other (this is a major assumption, but given time/resource constraints is necessary)</a:t>
-            </a:r>
-          </a:p>
-          <a:p>
-            <a:pPr lvl="1"/>
-            <a:endParaRPr lang="en-US" dirty="0">
-              <a:solidFill>
-                <a:srgbClr val="000000"/>
-              </a:solidFill>
-              <a:latin typeface="helvetica-w01-roman"/>
-            </a:endParaRPr>
-          </a:p>
-          <a:p>
-            <a:r>
-              <a:rPr lang="en-US" dirty="0">
-                <a:solidFill>
-                  <a:srgbClr val="000000"/>
-                </a:solidFill>
-                <a:latin typeface="helvetica-w01-roman"/>
-              </a:rPr>
-              <a:t>Used Facebook’s Prophet algorithm [9]</a:t>
-            </a:r>
-          </a:p>
-          <a:p>
-            <a:pPr lvl="1"/>
-            <a:r>
-              <a:rPr lang="en-US" b="0" i="0" dirty="0">
-                <a:solidFill>
-                  <a:srgbClr val="000000"/>
-                </a:solidFill>
-                <a:effectLst/>
-                <a:latin typeface="helvetica-w01-roman"/>
-              </a:rPr>
-              <a:t>Generalized Additional Model that uses a Bayesian approach to quantify uncertainty [10]</a:t>
-            </a:r>
-          </a:p>
-          <a:p>
-            <a:pPr lvl="1"/>
-            <a:r>
-              <a:rPr lang="en-US" dirty="0">
-                <a:solidFill>
-                  <a:srgbClr val="000000"/>
-                </a:solidFill>
-                <a:latin typeface="helvetica-w01-roman"/>
-              </a:rPr>
-              <a:t>Used linear fit due to time constraints (does not allow for constraints on sample values)</a:t>
-            </a:r>
-            <a:endParaRPr lang="en-US" dirty="0"/>
-          </a:p>
-        </p:txBody>
-      </p:sp>
-      <p:sp>
-        <p:nvSpPr>
-          <p:cNvPr id="4" name="Slide Number Placeholder 3"/>
-          <p:cNvSpPr>
-            <a:spLocks noGrp="1"/>
-          </p:cNvSpPr>
-          <p:nvPr>
-            <p:ph type="sldNum" sz="quarter" idx="12"/>
-          </p:nvPr>
-        </p:nvSpPr>
-        <p:spPr/>
-        <p:txBody>
-          <a:bodyPr/>
-          <a:lstStyle/>
-          <a:p>
-            <a:fld id="{A4DAB268-5651-8449-B4FF-0C1906E4DCE1}" type="slidenum">
-              <a:rPr lang="en-US" smtClean="0"/>
-              <a:t>9</a:t>
-            </a:fld>
-            <a:endParaRPr lang="en-US"/>
-          </a:p>
-        </p:txBody>
-      </p:sp>
-    </p:spTree>
-    <p:extLst>
-      <p:ext uri="{BB962C8B-B14F-4D97-AF65-F5344CB8AC3E}">
-        <p14:creationId xmlns:p14="http://schemas.microsoft.com/office/powerpoint/2010/main" val="3205473684"/>
       </p:ext>
     </p:extLst>
   </p:cSld>

</xml_diff>